<commit_message>
Changes to ip section
</commit_message>
<xml_diff>
--- a/TemporalPPT.pptx
+++ b/TemporalPPT.pptx
@@ -7,6 +7,7 @@
   <p:sldIdLst>
     <p:sldId id="257" r:id="rId2"/>
     <p:sldId id="258" r:id="rId3"/>
+    <p:sldId id="259" r:id="rId4"/>
   </p:sldIdLst>
   <p:sldSz cx="12192000" cy="6858000"/>
   <p:notesSz cx="6858000" cy="9144000"/>
@@ -260,7 +261,7 @@
           <a:p>
             <a:fld id="{850429CE-E1C8-4940-9903-88A64945F425}" type="datetimeFigureOut">
               <a:rPr lang="en-US" smtClean="0"/>
-              <a:t>2/16/2022</a:t>
+              <a:t>2/17/2022</a:t>
             </a:fld>
             <a:endParaRPr lang="en-US"/>
           </a:p>
@@ -458,7 +459,7 @@
           <a:p>
             <a:fld id="{850429CE-E1C8-4940-9903-88A64945F425}" type="datetimeFigureOut">
               <a:rPr lang="en-US" smtClean="0"/>
-              <a:t>2/16/2022</a:t>
+              <a:t>2/17/2022</a:t>
             </a:fld>
             <a:endParaRPr lang="en-US"/>
           </a:p>
@@ -666,7 +667,7 @@
           <a:p>
             <a:fld id="{850429CE-E1C8-4940-9903-88A64945F425}" type="datetimeFigureOut">
               <a:rPr lang="en-US" smtClean="0"/>
-              <a:t>2/16/2022</a:t>
+              <a:t>2/17/2022</a:t>
             </a:fld>
             <a:endParaRPr lang="en-US"/>
           </a:p>
@@ -864,7 +865,7 @@
           <a:p>
             <a:fld id="{850429CE-E1C8-4940-9903-88A64945F425}" type="datetimeFigureOut">
               <a:rPr lang="en-US" smtClean="0"/>
-              <a:t>2/16/2022</a:t>
+              <a:t>2/17/2022</a:t>
             </a:fld>
             <a:endParaRPr lang="en-US"/>
           </a:p>
@@ -1139,7 +1140,7 @@
           <a:p>
             <a:fld id="{850429CE-E1C8-4940-9903-88A64945F425}" type="datetimeFigureOut">
               <a:rPr lang="en-US" smtClean="0"/>
-              <a:t>2/16/2022</a:t>
+              <a:t>2/17/2022</a:t>
             </a:fld>
             <a:endParaRPr lang="en-US"/>
           </a:p>
@@ -1404,7 +1405,7 @@
           <a:p>
             <a:fld id="{850429CE-E1C8-4940-9903-88A64945F425}" type="datetimeFigureOut">
               <a:rPr lang="en-US" smtClean="0"/>
-              <a:t>2/16/2022</a:t>
+              <a:t>2/17/2022</a:t>
             </a:fld>
             <a:endParaRPr lang="en-US"/>
           </a:p>
@@ -1816,7 +1817,7 @@
           <a:p>
             <a:fld id="{850429CE-E1C8-4940-9903-88A64945F425}" type="datetimeFigureOut">
               <a:rPr lang="en-US" smtClean="0"/>
-              <a:t>2/16/2022</a:t>
+              <a:t>2/17/2022</a:t>
             </a:fld>
             <a:endParaRPr lang="en-US"/>
           </a:p>
@@ -1957,7 +1958,7 @@
           <a:p>
             <a:fld id="{850429CE-E1C8-4940-9903-88A64945F425}" type="datetimeFigureOut">
               <a:rPr lang="en-US" smtClean="0"/>
-              <a:t>2/16/2022</a:t>
+              <a:t>2/17/2022</a:t>
             </a:fld>
             <a:endParaRPr lang="en-US"/>
           </a:p>
@@ -2070,7 +2071,7 @@
           <a:p>
             <a:fld id="{850429CE-E1C8-4940-9903-88A64945F425}" type="datetimeFigureOut">
               <a:rPr lang="en-US" smtClean="0"/>
-              <a:t>2/16/2022</a:t>
+              <a:t>2/17/2022</a:t>
             </a:fld>
             <a:endParaRPr lang="en-US"/>
           </a:p>
@@ -2381,7 +2382,7 @@
           <a:p>
             <a:fld id="{850429CE-E1C8-4940-9903-88A64945F425}" type="datetimeFigureOut">
               <a:rPr lang="en-US" smtClean="0"/>
-              <a:t>2/16/2022</a:t>
+              <a:t>2/17/2022</a:t>
             </a:fld>
             <a:endParaRPr lang="en-US"/>
           </a:p>
@@ -2669,7 +2670,7 @@
           <a:p>
             <a:fld id="{850429CE-E1C8-4940-9903-88A64945F425}" type="datetimeFigureOut">
               <a:rPr lang="en-US" smtClean="0"/>
-              <a:t>2/16/2022</a:t>
+              <a:t>2/17/2022</a:t>
             </a:fld>
             <a:endParaRPr lang="en-US"/>
           </a:p>
@@ -2910,7 +2911,7 @@
           <a:p>
             <a:fld id="{850429CE-E1C8-4940-9903-88A64945F425}" type="datetimeFigureOut">
               <a:rPr lang="en-US" smtClean="0"/>
-              <a:t>2/16/2022</a:t>
+              <a:t>2/17/2022</a:t>
             </a:fld>
             <a:endParaRPr lang="en-US"/>
           </a:p>
@@ -3350,7 +3351,7 @@
           <a:p>
             <a:r>
               <a:rPr lang="en-US" dirty="0"/>
-              <a:t>Temporal Performance Testing</a:t>
+              <a:t>Temporal Performance Testing(Single Pod)</a:t>
             </a:r>
           </a:p>
         </p:txBody>
@@ -3371,7 +3372,7 @@
             <p:ph idx="1"/>
             <p:extLst>
               <p:ext uri="{D42A27DB-BD31-4B8C-83A1-F6EECF244321}">
-                <p14:modId xmlns:p14="http://schemas.microsoft.com/office/powerpoint/2010/main" val="4264015051"/>
+                <p14:modId xmlns:p14="http://schemas.microsoft.com/office/powerpoint/2010/main" val="707608388"/>
               </p:ext>
             </p:extLst>
           </p:nvPr>
@@ -4031,57 +4032,75 @@
                     <a:bodyPr/>
                     <a:lstStyle/>
                     <a:p>
-                      <a:endParaRPr lang="en-US" dirty="0"/>
-                    </a:p>
-                  </a:txBody>
-                  <a:tcPr/>
-                </a:tc>
-                <a:tc>
-                  <a:txBody>
-                    <a:bodyPr/>
-                    <a:lstStyle/>
-                    <a:p>
-                      <a:endParaRPr lang="en-US" dirty="0"/>
-                    </a:p>
-                  </a:txBody>
-                  <a:tcPr/>
-                </a:tc>
-                <a:tc>
-                  <a:txBody>
-                    <a:bodyPr/>
-                    <a:lstStyle/>
-                    <a:p>
-                      <a:endParaRPr lang="en-US" dirty="0"/>
-                    </a:p>
-                  </a:txBody>
-                  <a:tcPr/>
-                </a:tc>
-                <a:tc>
-                  <a:txBody>
-                    <a:bodyPr/>
-                    <a:lstStyle/>
-                    <a:p>
-                      <a:endParaRPr lang="en-US" dirty="0"/>
-                    </a:p>
-                  </a:txBody>
-                  <a:tcPr/>
-                </a:tc>
-                <a:tc>
-                  <a:txBody>
-                    <a:bodyPr/>
-                    <a:lstStyle/>
-                    <a:p>
-                      <a:endParaRPr lang="en-US" dirty="0"/>
-                    </a:p>
-                  </a:txBody>
-                  <a:tcPr/>
-                </a:tc>
-                <a:tc>
-                  <a:txBody>
-                    <a:bodyPr/>
-                    <a:lstStyle/>
-                    <a:p>
-                      <a:endParaRPr lang="en-US" dirty="0"/>
+                      <a:r>
+                        <a:rPr lang="en-US" dirty="0"/>
+                        <a:t>22,000</a:t>
+                      </a:r>
+                    </a:p>
+                  </a:txBody>
+                  <a:tcPr/>
+                </a:tc>
+                <a:tc>
+                  <a:txBody>
+                    <a:bodyPr/>
+                    <a:lstStyle/>
+                    <a:p>
+                      <a:r>
+                        <a:rPr lang="en-US" dirty="0"/>
+                        <a:t>991</a:t>
+                      </a:r>
+                    </a:p>
+                  </a:txBody>
+                  <a:tcPr/>
+                </a:tc>
+                <a:tc>
+                  <a:txBody>
+                    <a:bodyPr/>
+                    <a:lstStyle/>
+                    <a:p>
+                      <a:r>
+                        <a:rPr lang="en-US" dirty="0"/>
+                        <a:t>15</a:t>
+                      </a:r>
+                    </a:p>
+                  </a:txBody>
+                  <a:tcPr/>
+                </a:tc>
+                <a:tc>
+                  <a:txBody>
+                    <a:bodyPr/>
+                    <a:lstStyle/>
+                    <a:p>
+                      <a:r>
+                        <a:rPr lang="en-US" dirty="0"/>
+                        <a:t>3991</a:t>
+                      </a:r>
+                    </a:p>
+                  </a:txBody>
+                  <a:tcPr/>
+                </a:tc>
+                <a:tc>
+                  <a:txBody>
+                    <a:bodyPr/>
+                    <a:lstStyle/>
+                    <a:p>
+                      <a:r>
+                        <a:rPr lang="en-US" dirty="0"/>
+                        <a:t>1.01%</a:t>
+                      </a:r>
+                    </a:p>
+                  </a:txBody>
+                  <a:tcPr/>
+                </a:tc>
+                <a:tc>
+                  <a:txBody>
+                    <a:bodyPr/>
+                    <a:lstStyle/>
+                    <a:p>
+                      <a:r>
+                        <a:rPr lang="en-US" dirty="0"/>
+                        <a:t>366.0/s</a:t>
+                      </a:r>
                     </a:p>
                   </a:txBody>
                   <a:tcPr/>
@@ -4787,7 +4806,7 @@
           <a:p>
             <a:r>
               <a:rPr lang="en-US" dirty="0"/>
-              <a:t>Temporal, Demo, Proxy each have been  horizontally scaled to 3 pods each</a:t>
+              <a:t>Temporal, Demo, Proxy each have been  horizontally scaled to 3 pods each afterwards</a:t>
             </a:r>
           </a:p>
         </p:txBody>
@@ -4796,6 +4815,1020 @@
     <p:extLst>
       <p:ext uri="{BB962C8B-B14F-4D97-AF65-F5344CB8AC3E}">
         <p14:creationId xmlns:p14="http://schemas.microsoft.com/office/powerpoint/2010/main" val="1509296860"/>
+      </p:ext>
+    </p:extLst>
+  </p:cSld>
+  <p:clrMapOvr>
+    <a:masterClrMapping/>
+  </p:clrMapOvr>
+</p:sld>
+</file>
+
+<file path=ppt/slides/slide3.xml><?xml version="1.0" encoding="utf-8"?>
+<p:sld xmlns:a="http://schemas.openxmlformats.org/drawingml/2006/main" xmlns:r="http://schemas.openxmlformats.org/officeDocument/2006/relationships" xmlns:p="http://schemas.openxmlformats.org/presentationml/2006/main">
+  <p:cSld>
+    <p:spTree>
+      <p:nvGrpSpPr>
+        <p:cNvPr id="1" name=""/>
+        <p:cNvGrpSpPr/>
+        <p:nvPr/>
+      </p:nvGrpSpPr>
+      <p:grpSpPr>
+        <a:xfrm>
+          <a:off x="0" y="0"/>
+          <a:ext cx="0" cy="0"/>
+          <a:chOff x="0" y="0"/>
+          <a:chExt cx="0" cy="0"/>
+        </a:xfrm>
+      </p:grpSpPr>
+      <p:sp>
+        <p:nvSpPr>
+          <p:cNvPr id="2" name="Title 1">
+            <a:extLst>
+              <a:ext uri="{FF2B5EF4-FFF2-40B4-BE49-F238E27FC236}">
+                <a16:creationId xmlns:a16="http://schemas.microsoft.com/office/drawing/2014/main" id="{39889993-3D66-47DC-8CC8-0C1A2ADED04C}"/>
+              </a:ext>
+            </a:extLst>
+          </p:cNvPr>
+          <p:cNvSpPr>
+            <a:spLocks noGrp="1"/>
+          </p:cNvSpPr>
+          <p:nvPr>
+            <p:ph type="title"/>
+          </p:nvPr>
+        </p:nvSpPr>
+        <p:spPr/>
+        <p:txBody>
+          <a:bodyPr/>
+          <a:lstStyle/>
+          <a:p>
+            <a:r>
+              <a:rPr lang="en-US" dirty="0"/>
+              <a:t>Temporal Performance Testing(Horizontal)</a:t>
+            </a:r>
+          </a:p>
+        </p:txBody>
+      </p:sp>
+      <p:graphicFrame>
+        <p:nvGraphicFramePr>
+          <p:cNvPr id="5" name="Table 5">
+            <a:extLst>
+              <a:ext uri="{FF2B5EF4-FFF2-40B4-BE49-F238E27FC236}">
+                <a16:creationId xmlns:a16="http://schemas.microsoft.com/office/drawing/2014/main" id="{2EC76E86-1220-4A06-825C-860010F0480F}"/>
+              </a:ext>
+            </a:extLst>
+          </p:cNvPr>
+          <p:cNvGraphicFramePr>
+            <a:graphicFrameLocks noGrp="1"/>
+          </p:cNvGraphicFramePr>
+          <p:nvPr>
+            <p:ph idx="1"/>
+            <p:extLst>
+              <p:ext uri="{D42A27DB-BD31-4B8C-83A1-F6EECF244321}">
+                <p14:modId xmlns:p14="http://schemas.microsoft.com/office/powerpoint/2010/main" val="2858215231"/>
+              </p:ext>
+            </p:extLst>
+          </p:nvPr>
+        </p:nvGraphicFramePr>
+        <p:xfrm>
+          <a:off x="518160" y="2502455"/>
+          <a:ext cx="11348720" cy="3175000"/>
+        </p:xfrm>
+        <a:graphic>
+          <a:graphicData uri="http://schemas.openxmlformats.org/drawingml/2006/table">
+            <a:tbl>
+              <a:tblPr firstRow="1" bandRow="1">
+                <a:tableStyleId>{5C22544A-7EE6-4342-B048-85BDC9FD1C3A}</a:tableStyleId>
+              </a:tblPr>
+              <a:tblGrid>
+                <a:gridCol w="1418590">
+                  <a:extLst>
+                    <a:ext uri="{9D8B030D-6E8A-4147-A177-3AD203B41FA5}">
+                      <a16:colId xmlns:a16="http://schemas.microsoft.com/office/drawing/2014/main" val="3123463855"/>
+                    </a:ext>
+                  </a:extLst>
+                </a:gridCol>
+                <a:gridCol w="1418590">
+                  <a:extLst>
+                    <a:ext uri="{9D8B030D-6E8A-4147-A177-3AD203B41FA5}">
+                      <a16:colId xmlns:a16="http://schemas.microsoft.com/office/drawing/2014/main" val="3695574965"/>
+                    </a:ext>
+                  </a:extLst>
+                </a:gridCol>
+                <a:gridCol w="1418590">
+                  <a:extLst>
+                    <a:ext uri="{9D8B030D-6E8A-4147-A177-3AD203B41FA5}">
+                      <a16:colId xmlns:a16="http://schemas.microsoft.com/office/drawing/2014/main" val="3827456604"/>
+                    </a:ext>
+                  </a:extLst>
+                </a:gridCol>
+                <a:gridCol w="1418590">
+                  <a:extLst>
+                    <a:ext uri="{9D8B030D-6E8A-4147-A177-3AD203B41FA5}">
+                      <a16:colId xmlns:a16="http://schemas.microsoft.com/office/drawing/2014/main" val="3688388164"/>
+                    </a:ext>
+                  </a:extLst>
+                </a:gridCol>
+                <a:gridCol w="1418590">
+                  <a:extLst>
+                    <a:ext uri="{9D8B030D-6E8A-4147-A177-3AD203B41FA5}">
+                      <a16:colId xmlns:a16="http://schemas.microsoft.com/office/drawing/2014/main" val="4123628749"/>
+                    </a:ext>
+                  </a:extLst>
+                </a:gridCol>
+                <a:gridCol w="1418590">
+                  <a:extLst>
+                    <a:ext uri="{9D8B030D-6E8A-4147-A177-3AD203B41FA5}">
+                      <a16:colId xmlns:a16="http://schemas.microsoft.com/office/drawing/2014/main" val="1343719533"/>
+                    </a:ext>
+                  </a:extLst>
+                </a:gridCol>
+                <a:gridCol w="1418590">
+                  <a:extLst>
+                    <a:ext uri="{9D8B030D-6E8A-4147-A177-3AD203B41FA5}">
+                      <a16:colId xmlns:a16="http://schemas.microsoft.com/office/drawing/2014/main" val="3764111653"/>
+                    </a:ext>
+                  </a:extLst>
+                </a:gridCol>
+                <a:gridCol w="1418590">
+                  <a:extLst>
+                    <a:ext uri="{9D8B030D-6E8A-4147-A177-3AD203B41FA5}">
+                      <a16:colId xmlns:a16="http://schemas.microsoft.com/office/drawing/2014/main" val="4279144326"/>
+                    </a:ext>
+                  </a:extLst>
+                </a:gridCol>
+              </a:tblGrid>
+              <a:tr h="370840">
+                <a:tc>
+                  <a:txBody>
+                    <a:bodyPr/>
+                    <a:lstStyle/>
+                    <a:p>
+                      <a:r>
+                        <a:rPr lang="en-US" sz="1600" dirty="0"/>
+                        <a:t>THREADS</a:t>
+                      </a:r>
+                    </a:p>
+                  </a:txBody>
+                  <a:tcPr/>
+                </a:tc>
+                <a:tc>
+                  <a:txBody>
+                    <a:bodyPr/>
+                    <a:lstStyle/>
+                    <a:p>
+                      <a:r>
+                        <a:rPr lang="en-US" sz="1600" dirty="0"/>
+                        <a:t>AVERAGE</a:t>
+                      </a:r>
+                    </a:p>
+                  </a:txBody>
+                  <a:tcPr/>
+                </a:tc>
+                <a:tc>
+                  <a:txBody>
+                    <a:bodyPr/>
+                    <a:lstStyle/>
+                    <a:p>
+                      <a:r>
+                        <a:rPr lang="en-US" sz="1600" dirty="0"/>
+                        <a:t>THROUGHPUT</a:t>
+                      </a:r>
+                    </a:p>
+                  </a:txBody>
+                  <a:tcPr/>
+                </a:tc>
+                <a:tc>
+                  <a:txBody>
+                    <a:bodyPr/>
+                    <a:lstStyle/>
+                    <a:p>
+                      <a:r>
+                        <a:rPr lang="en-US" sz="1600" dirty="0"/>
+                        <a:t>MIN</a:t>
+                      </a:r>
+                    </a:p>
+                  </a:txBody>
+                  <a:tcPr/>
+                </a:tc>
+                <a:tc>
+                  <a:txBody>
+                    <a:bodyPr/>
+                    <a:lstStyle/>
+                    <a:p>
+                      <a:r>
+                        <a:rPr lang="en-US" sz="1600" dirty="0"/>
+                        <a:t>MAX</a:t>
+                      </a:r>
+                    </a:p>
+                  </a:txBody>
+                  <a:tcPr/>
+                </a:tc>
+                <a:tc>
+                  <a:txBody>
+                    <a:bodyPr/>
+                    <a:lstStyle/>
+                    <a:p>
+                      <a:r>
+                        <a:rPr lang="en-US" sz="1600" dirty="0"/>
+                        <a:t>CPU USAGE</a:t>
+                      </a:r>
+                    </a:p>
+                    <a:p>
+                      <a:r>
+                        <a:rPr lang="en-US" sz="1600" dirty="0"/>
+                        <a:t>(IN %)</a:t>
+                      </a:r>
+                    </a:p>
+                  </a:txBody>
+                  <a:tcPr/>
+                </a:tc>
+                <a:tc>
+                  <a:txBody>
+                    <a:bodyPr/>
+                    <a:lstStyle/>
+                    <a:p>
+                      <a:r>
+                        <a:rPr lang="en-US" sz="1500" dirty="0"/>
+                        <a:t>MEMORY USAGE(in MiB)</a:t>
+                      </a:r>
+                    </a:p>
+                  </a:txBody>
+                  <a:tcPr/>
+                </a:tc>
+                <a:tc>
+                  <a:txBody>
+                    <a:bodyPr/>
+                    <a:lstStyle/>
+                    <a:p>
+                      <a:r>
+                        <a:rPr lang="en-US" sz="1600" dirty="0"/>
+                        <a:t>ERROR</a:t>
+                      </a:r>
+                    </a:p>
+                    <a:p>
+                      <a:r>
+                        <a:rPr lang="en-US" sz="1600" dirty="0"/>
+                        <a:t>(In %)</a:t>
+                      </a:r>
+                    </a:p>
+                  </a:txBody>
+                  <a:tcPr/>
+                </a:tc>
+                <a:extLst>
+                  <a:ext uri="{0D108BD9-81ED-4DB2-BD59-A6C34878D82A}">
+                    <a16:rowId xmlns:a16="http://schemas.microsoft.com/office/drawing/2014/main" val="1151001714"/>
+                  </a:ext>
+                </a:extLst>
+              </a:tr>
+              <a:tr h="370840">
+                <a:tc>
+                  <a:txBody>
+                    <a:bodyPr/>
+                    <a:lstStyle/>
+                    <a:p>
+                      <a:r>
+                        <a:rPr lang="en-US" dirty="0"/>
+                        <a:t>5000</a:t>
+                      </a:r>
+                    </a:p>
+                  </a:txBody>
+                  <a:tcPr/>
+                </a:tc>
+                <a:tc>
+                  <a:txBody>
+                    <a:bodyPr/>
+                    <a:lstStyle/>
+                    <a:p>
+                      <a:r>
+                        <a:rPr lang="en-US" dirty="0"/>
+                        <a:t>225</a:t>
+                      </a:r>
+                    </a:p>
+                  </a:txBody>
+                  <a:tcPr/>
+                </a:tc>
+                <a:tc>
+                  <a:txBody>
+                    <a:bodyPr/>
+                    <a:lstStyle/>
+                    <a:p>
+                      <a:r>
+                        <a:rPr lang="en-US" dirty="0"/>
+                        <a:t>83.1/s</a:t>
+                      </a:r>
+                    </a:p>
+                  </a:txBody>
+                  <a:tcPr/>
+                </a:tc>
+                <a:tc>
+                  <a:txBody>
+                    <a:bodyPr/>
+                    <a:lstStyle/>
+                    <a:p>
+                      <a:r>
+                        <a:rPr lang="en-US" dirty="0"/>
+                        <a:t>10</a:t>
+                      </a:r>
+                    </a:p>
+                  </a:txBody>
+                  <a:tcPr/>
+                </a:tc>
+                <a:tc>
+                  <a:txBody>
+                    <a:bodyPr/>
+                    <a:lstStyle/>
+                    <a:p>
+                      <a:r>
+                        <a:rPr lang="en-US" dirty="0"/>
+                        <a:t>2639</a:t>
+                      </a:r>
+                    </a:p>
+                  </a:txBody>
+                  <a:tcPr/>
+                </a:tc>
+                <a:tc>
+                  <a:txBody>
+                    <a:bodyPr/>
+                    <a:lstStyle/>
+                    <a:p>
+                      <a:r>
+                        <a:rPr lang="en-US" dirty="0"/>
+                        <a:t>64%</a:t>
+                      </a:r>
+                    </a:p>
+                  </a:txBody>
+                  <a:tcPr/>
+                </a:tc>
+                <a:tc>
+                  <a:txBody>
+                    <a:bodyPr/>
+                    <a:lstStyle/>
+                    <a:p>
+                      <a:r>
+                        <a:rPr lang="en-US" dirty="0"/>
+                        <a:t>443</a:t>
+                      </a:r>
+                    </a:p>
+                  </a:txBody>
+                  <a:tcPr/>
+                </a:tc>
+                <a:tc>
+                  <a:txBody>
+                    <a:bodyPr/>
+                    <a:lstStyle/>
+                    <a:p>
+                      <a:r>
+                        <a:rPr lang="en-US" dirty="0"/>
+                        <a:t>0.00%</a:t>
+                      </a:r>
+                    </a:p>
+                  </a:txBody>
+                  <a:tcPr/>
+                </a:tc>
+                <a:extLst>
+                  <a:ext uri="{0D108BD9-81ED-4DB2-BD59-A6C34878D82A}">
+                    <a16:rowId xmlns:a16="http://schemas.microsoft.com/office/drawing/2014/main" val="3477622308"/>
+                  </a:ext>
+                </a:extLst>
+              </a:tr>
+              <a:tr h="370840">
+                <a:tc>
+                  <a:txBody>
+                    <a:bodyPr/>
+                    <a:lstStyle/>
+                    <a:p>
+                      <a:r>
+                        <a:rPr lang="en-US" dirty="0"/>
+                        <a:t>9000</a:t>
+                      </a:r>
+                    </a:p>
+                  </a:txBody>
+                  <a:tcPr/>
+                </a:tc>
+                <a:tc>
+                  <a:txBody>
+                    <a:bodyPr/>
+                    <a:lstStyle/>
+                    <a:p>
+                      <a:r>
+                        <a:rPr lang="en-US" dirty="0"/>
+                        <a:t>297</a:t>
+                      </a:r>
+                    </a:p>
+                  </a:txBody>
+                  <a:tcPr/>
+                </a:tc>
+                <a:tc>
+                  <a:txBody>
+                    <a:bodyPr/>
+                    <a:lstStyle/>
+                    <a:p>
+                      <a:r>
+                        <a:rPr lang="en-US" dirty="0"/>
+                        <a:t>141.1/s</a:t>
+                      </a:r>
+                    </a:p>
+                  </a:txBody>
+                  <a:tcPr/>
+                </a:tc>
+                <a:tc>
+                  <a:txBody>
+                    <a:bodyPr/>
+                    <a:lstStyle/>
+                    <a:p>
+                      <a:r>
+                        <a:rPr lang="en-US" dirty="0"/>
+                        <a:t>11</a:t>
+                      </a:r>
+                    </a:p>
+                  </a:txBody>
+                  <a:tcPr/>
+                </a:tc>
+                <a:tc>
+                  <a:txBody>
+                    <a:bodyPr/>
+                    <a:lstStyle/>
+                    <a:p>
+                      <a:r>
+                        <a:rPr lang="en-US" dirty="0"/>
+                        <a:t>2802</a:t>
+                      </a:r>
+                    </a:p>
+                  </a:txBody>
+                  <a:tcPr/>
+                </a:tc>
+                <a:tc>
+                  <a:txBody>
+                    <a:bodyPr/>
+                    <a:lstStyle/>
+                    <a:p>
+                      <a:r>
+                        <a:rPr lang="en-US" dirty="0"/>
+                        <a:t>63%</a:t>
+                      </a:r>
+                    </a:p>
+                  </a:txBody>
+                  <a:tcPr/>
+                </a:tc>
+                <a:tc>
+                  <a:txBody>
+                    <a:bodyPr/>
+                    <a:lstStyle/>
+                    <a:p>
+                      <a:r>
+                        <a:rPr lang="en-US" dirty="0"/>
+                        <a:t>473</a:t>
+                      </a:r>
+                    </a:p>
+                  </a:txBody>
+                  <a:tcPr/>
+                </a:tc>
+                <a:tc>
+                  <a:txBody>
+                    <a:bodyPr/>
+                    <a:lstStyle/>
+                    <a:p>
+                      <a:r>
+                        <a:rPr lang="en-US" dirty="0"/>
+                        <a:t>0.00%</a:t>
+                      </a:r>
+                    </a:p>
+                  </a:txBody>
+                  <a:tcPr/>
+                </a:tc>
+                <a:extLst>
+                  <a:ext uri="{0D108BD9-81ED-4DB2-BD59-A6C34878D82A}">
+                    <a16:rowId xmlns:a16="http://schemas.microsoft.com/office/drawing/2014/main" val="3221243530"/>
+                  </a:ext>
+                </a:extLst>
+              </a:tr>
+              <a:tr h="370840">
+                <a:tc>
+                  <a:txBody>
+                    <a:bodyPr/>
+                    <a:lstStyle/>
+                    <a:p>
+                      <a:r>
+                        <a:rPr lang="en-US" dirty="0"/>
+                        <a:t>12,000</a:t>
+                      </a:r>
+                    </a:p>
+                  </a:txBody>
+                  <a:tcPr/>
+                </a:tc>
+                <a:tc>
+                  <a:txBody>
+                    <a:bodyPr/>
+                    <a:lstStyle/>
+                    <a:p>
+                      <a:r>
+                        <a:rPr lang="en-US" dirty="0"/>
+                        <a:t>788</a:t>
+                      </a:r>
+                    </a:p>
+                  </a:txBody>
+                  <a:tcPr/>
+                </a:tc>
+                <a:tc>
+                  <a:txBody>
+                    <a:bodyPr/>
+                    <a:lstStyle/>
+                    <a:p>
+                      <a:r>
+                        <a:rPr lang="en-US" dirty="0"/>
+                        <a:t>196.2/s</a:t>
+                      </a:r>
+                    </a:p>
+                  </a:txBody>
+                  <a:tcPr/>
+                </a:tc>
+                <a:tc>
+                  <a:txBody>
+                    <a:bodyPr/>
+                    <a:lstStyle/>
+                    <a:p>
+                      <a:r>
+                        <a:rPr lang="en-US" dirty="0"/>
+                        <a:t>10</a:t>
+                      </a:r>
+                    </a:p>
+                  </a:txBody>
+                  <a:tcPr/>
+                </a:tc>
+                <a:tc>
+                  <a:txBody>
+                    <a:bodyPr/>
+                    <a:lstStyle/>
+                    <a:p>
+                      <a:r>
+                        <a:rPr lang="en-US" dirty="0"/>
+                        <a:t>4127</a:t>
+                      </a:r>
+                    </a:p>
+                  </a:txBody>
+                  <a:tcPr/>
+                </a:tc>
+                <a:tc>
+                  <a:txBody>
+                    <a:bodyPr/>
+                    <a:lstStyle/>
+                    <a:p>
+                      <a:r>
+                        <a:rPr lang="en-US" dirty="0"/>
+                        <a:t>49%</a:t>
+                      </a:r>
+                    </a:p>
+                  </a:txBody>
+                  <a:tcPr/>
+                </a:tc>
+                <a:tc>
+                  <a:txBody>
+                    <a:bodyPr/>
+                    <a:lstStyle/>
+                    <a:p>
+                      <a:r>
+                        <a:rPr lang="en-US" dirty="0"/>
+                        <a:t>552</a:t>
+                      </a:r>
+                    </a:p>
+                  </a:txBody>
+                  <a:tcPr/>
+                </a:tc>
+                <a:tc>
+                  <a:txBody>
+                    <a:bodyPr/>
+                    <a:lstStyle/>
+                    <a:p>
+                      <a:r>
+                        <a:rPr lang="en-US" dirty="0"/>
+                        <a:t>0.58%</a:t>
+                      </a:r>
+                    </a:p>
+                  </a:txBody>
+                  <a:tcPr/>
+                </a:tc>
+                <a:extLst>
+                  <a:ext uri="{0D108BD9-81ED-4DB2-BD59-A6C34878D82A}">
+                    <a16:rowId xmlns:a16="http://schemas.microsoft.com/office/drawing/2014/main" val="2248632833"/>
+                  </a:ext>
+                </a:extLst>
+              </a:tr>
+              <a:tr h="370840">
+                <a:tc>
+                  <a:txBody>
+                    <a:bodyPr/>
+                    <a:lstStyle/>
+                    <a:p>
+                      <a:r>
+                        <a:rPr lang="en-US" dirty="0"/>
+                        <a:t>15,000</a:t>
+                      </a:r>
+                    </a:p>
+                  </a:txBody>
+                  <a:tcPr/>
+                </a:tc>
+                <a:tc>
+                  <a:txBody>
+                    <a:bodyPr/>
+                    <a:lstStyle/>
+                    <a:p>
+                      <a:r>
+                        <a:rPr lang="en-US" dirty="0"/>
+                        <a:t>1314</a:t>
+                      </a:r>
+                    </a:p>
+                  </a:txBody>
+                  <a:tcPr/>
+                </a:tc>
+                <a:tc>
+                  <a:txBody>
+                    <a:bodyPr/>
+                    <a:lstStyle/>
+                    <a:p>
+                      <a:r>
+                        <a:rPr lang="en-US" dirty="0"/>
+                        <a:t>245.0/s</a:t>
+                      </a:r>
+                    </a:p>
+                  </a:txBody>
+                  <a:tcPr/>
+                </a:tc>
+                <a:tc>
+                  <a:txBody>
+                    <a:bodyPr/>
+                    <a:lstStyle/>
+                    <a:p>
+                      <a:r>
+                        <a:rPr lang="en-US" dirty="0"/>
+                        <a:t>15</a:t>
+                      </a:r>
+                    </a:p>
+                  </a:txBody>
+                  <a:tcPr/>
+                </a:tc>
+                <a:tc>
+                  <a:txBody>
+                    <a:bodyPr/>
+                    <a:lstStyle/>
+                    <a:p>
+                      <a:r>
+                        <a:rPr lang="en-US" dirty="0"/>
+                        <a:t>4274</a:t>
+                      </a:r>
+                    </a:p>
+                  </a:txBody>
+                  <a:tcPr/>
+                </a:tc>
+                <a:tc>
+                  <a:txBody>
+                    <a:bodyPr/>
+                    <a:lstStyle/>
+                    <a:p>
+                      <a:r>
+                        <a:rPr lang="en-US" dirty="0"/>
+                        <a:t>46%</a:t>
+                      </a:r>
+                    </a:p>
+                  </a:txBody>
+                  <a:tcPr/>
+                </a:tc>
+                <a:tc>
+                  <a:txBody>
+                    <a:bodyPr/>
+                    <a:lstStyle/>
+                    <a:p>
+                      <a:r>
+                        <a:rPr lang="en-US" dirty="0"/>
+                        <a:t>627</a:t>
+                      </a:r>
+                    </a:p>
+                  </a:txBody>
+                  <a:tcPr/>
+                </a:tc>
+                <a:tc>
+                  <a:txBody>
+                    <a:bodyPr/>
+                    <a:lstStyle/>
+                    <a:p>
+                      <a:r>
+                        <a:rPr lang="en-US" dirty="0"/>
+                        <a:t>1.62%</a:t>
+                      </a:r>
+                    </a:p>
+                  </a:txBody>
+                  <a:tcPr/>
+                </a:tc>
+                <a:extLst>
+                  <a:ext uri="{0D108BD9-81ED-4DB2-BD59-A6C34878D82A}">
+                    <a16:rowId xmlns:a16="http://schemas.microsoft.com/office/drawing/2014/main" val="910085717"/>
+                  </a:ext>
+                </a:extLst>
+              </a:tr>
+              <a:tr h="370840">
+                <a:tc>
+                  <a:txBody>
+                    <a:bodyPr/>
+                    <a:lstStyle/>
+                    <a:p>
+                      <a:endParaRPr lang="en-US"/>
+                    </a:p>
+                  </a:txBody>
+                  <a:tcPr/>
+                </a:tc>
+                <a:tc>
+                  <a:txBody>
+                    <a:bodyPr/>
+                    <a:lstStyle/>
+                    <a:p>
+                      <a:endParaRPr lang="en-US"/>
+                    </a:p>
+                  </a:txBody>
+                  <a:tcPr/>
+                </a:tc>
+                <a:tc>
+                  <a:txBody>
+                    <a:bodyPr/>
+                    <a:lstStyle/>
+                    <a:p>
+                      <a:endParaRPr lang="en-US"/>
+                    </a:p>
+                  </a:txBody>
+                  <a:tcPr/>
+                </a:tc>
+                <a:tc>
+                  <a:txBody>
+                    <a:bodyPr/>
+                    <a:lstStyle/>
+                    <a:p>
+                      <a:endParaRPr lang="en-US"/>
+                    </a:p>
+                  </a:txBody>
+                  <a:tcPr/>
+                </a:tc>
+                <a:tc>
+                  <a:txBody>
+                    <a:bodyPr/>
+                    <a:lstStyle/>
+                    <a:p>
+                      <a:endParaRPr lang="en-US"/>
+                    </a:p>
+                  </a:txBody>
+                  <a:tcPr/>
+                </a:tc>
+                <a:tc>
+                  <a:txBody>
+                    <a:bodyPr/>
+                    <a:lstStyle/>
+                    <a:p>
+                      <a:endParaRPr lang="en-US"/>
+                    </a:p>
+                  </a:txBody>
+                  <a:tcPr/>
+                </a:tc>
+                <a:tc>
+                  <a:txBody>
+                    <a:bodyPr/>
+                    <a:lstStyle/>
+                    <a:p>
+                      <a:endParaRPr lang="en-US"/>
+                    </a:p>
+                  </a:txBody>
+                  <a:tcPr/>
+                </a:tc>
+                <a:tc>
+                  <a:txBody>
+                    <a:bodyPr/>
+                    <a:lstStyle/>
+                    <a:p>
+                      <a:endParaRPr lang="en-US"/>
+                    </a:p>
+                  </a:txBody>
+                  <a:tcPr/>
+                </a:tc>
+                <a:extLst>
+                  <a:ext uri="{0D108BD9-81ED-4DB2-BD59-A6C34878D82A}">
+                    <a16:rowId xmlns:a16="http://schemas.microsoft.com/office/drawing/2014/main" val="827998233"/>
+                  </a:ext>
+                </a:extLst>
+              </a:tr>
+              <a:tr h="370840">
+                <a:tc>
+                  <a:txBody>
+                    <a:bodyPr/>
+                    <a:lstStyle/>
+                    <a:p>
+                      <a:endParaRPr lang="en-US"/>
+                    </a:p>
+                  </a:txBody>
+                  <a:tcPr/>
+                </a:tc>
+                <a:tc>
+                  <a:txBody>
+                    <a:bodyPr/>
+                    <a:lstStyle/>
+                    <a:p>
+                      <a:endParaRPr lang="en-US"/>
+                    </a:p>
+                  </a:txBody>
+                  <a:tcPr/>
+                </a:tc>
+                <a:tc>
+                  <a:txBody>
+                    <a:bodyPr/>
+                    <a:lstStyle/>
+                    <a:p>
+                      <a:endParaRPr lang="en-US"/>
+                    </a:p>
+                  </a:txBody>
+                  <a:tcPr/>
+                </a:tc>
+                <a:tc>
+                  <a:txBody>
+                    <a:bodyPr/>
+                    <a:lstStyle/>
+                    <a:p>
+                      <a:endParaRPr lang="en-US"/>
+                    </a:p>
+                  </a:txBody>
+                  <a:tcPr/>
+                </a:tc>
+                <a:tc>
+                  <a:txBody>
+                    <a:bodyPr/>
+                    <a:lstStyle/>
+                    <a:p>
+                      <a:endParaRPr lang="en-US"/>
+                    </a:p>
+                  </a:txBody>
+                  <a:tcPr/>
+                </a:tc>
+                <a:tc>
+                  <a:txBody>
+                    <a:bodyPr/>
+                    <a:lstStyle/>
+                    <a:p>
+                      <a:endParaRPr lang="en-US"/>
+                    </a:p>
+                  </a:txBody>
+                  <a:tcPr/>
+                </a:tc>
+                <a:tc>
+                  <a:txBody>
+                    <a:bodyPr/>
+                    <a:lstStyle/>
+                    <a:p>
+                      <a:endParaRPr lang="en-US"/>
+                    </a:p>
+                  </a:txBody>
+                  <a:tcPr/>
+                </a:tc>
+                <a:tc>
+                  <a:txBody>
+                    <a:bodyPr/>
+                    <a:lstStyle/>
+                    <a:p>
+                      <a:endParaRPr lang="en-US"/>
+                    </a:p>
+                  </a:txBody>
+                  <a:tcPr/>
+                </a:tc>
+                <a:extLst>
+                  <a:ext uri="{0D108BD9-81ED-4DB2-BD59-A6C34878D82A}">
+                    <a16:rowId xmlns:a16="http://schemas.microsoft.com/office/drawing/2014/main" val="2070349178"/>
+                  </a:ext>
+                </a:extLst>
+              </a:tr>
+              <a:tr h="370840">
+                <a:tc>
+                  <a:txBody>
+                    <a:bodyPr/>
+                    <a:lstStyle/>
+                    <a:p>
+                      <a:endParaRPr lang="en-US"/>
+                    </a:p>
+                  </a:txBody>
+                  <a:tcPr/>
+                </a:tc>
+                <a:tc>
+                  <a:txBody>
+                    <a:bodyPr/>
+                    <a:lstStyle/>
+                    <a:p>
+                      <a:endParaRPr lang="en-US"/>
+                    </a:p>
+                  </a:txBody>
+                  <a:tcPr/>
+                </a:tc>
+                <a:tc>
+                  <a:txBody>
+                    <a:bodyPr/>
+                    <a:lstStyle/>
+                    <a:p>
+                      <a:endParaRPr lang="en-US"/>
+                    </a:p>
+                  </a:txBody>
+                  <a:tcPr/>
+                </a:tc>
+                <a:tc>
+                  <a:txBody>
+                    <a:bodyPr/>
+                    <a:lstStyle/>
+                    <a:p>
+                      <a:endParaRPr lang="en-US"/>
+                    </a:p>
+                  </a:txBody>
+                  <a:tcPr/>
+                </a:tc>
+                <a:tc>
+                  <a:txBody>
+                    <a:bodyPr/>
+                    <a:lstStyle/>
+                    <a:p>
+                      <a:endParaRPr lang="en-US"/>
+                    </a:p>
+                  </a:txBody>
+                  <a:tcPr/>
+                </a:tc>
+                <a:tc>
+                  <a:txBody>
+                    <a:bodyPr/>
+                    <a:lstStyle/>
+                    <a:p>
+                      <a:endParaRPr lang="en-US"/>
+                    </a:p>
+                  </a:txBody>
+                  <a:tcPr/>
+                </a:tc>
+                <a:tc>
+                  <a:txBody>
+                    <a:bodyPr/>
+                    <a:lstStyle/>
+                    <a:p>
+                      <a:endParaRPr lang="en-US"/>
+                    </a:p>
+                  </a:txBody>
+                  <a:tcPr/>
+                </a:tc>
+                <a:tc>
+                  <a:txBody>
+                    <a:bodyPr/>
+                    <a:lstStyle/>
+                    <a:p>
+                      <a:endParaRPr lang="en-US" dirty="0"/>
+                    </a:p>
+                  </a:txBody>
+                  <a:tcPr/>
+                </a:tc>
+                <a:extLst>
+                  <a:ext uri="{0D108BD9-81ED-4DB2-BD59-A6C34878D82A}">
+                    <a16:rowId xmlns:a16="http://schemas.microsoft.com/office/drawing/2014/main" val="2430330095"/>
+                  </a:ext>
+                </a:extLst>
+              </a:tr>
+            </a:tbl>
+          </a:graphicData>
+        </a:graphic>
+      </p:graphicFrame>
+      <p:sp>
+        <p:nvSpPr>
+          <p:cNvPr id="4" name="TextBox 3">
+            <a:extLst>
+              <a:ext uri="{FF2B5EF4-FFF2-40B4-BE49-F238E27FC236}">
+                <a16:creationId xmlns:a16="http://schemas.microsoft.com/office/drawing/2014/main" id="{DAE5B524-85EC-4F49-8FCC-411797D0587A}"/>
+              </a:ext>
+            </a:extLst>
+          </p:cNvPr>
+          <p:cNvSpPr txBox="1"/>
+          <p:nvPr/>
+        </p:nvSpPr>
+        <p:spPr>
+          <a:xfrm>
+            <a:off x="1158240" y="1542573"/>
+            <a:ext cx="10378440" cy="369332"/>
+          </a:xfrm>
+          <a:prstGeom prst="rect">
+            <a:avLst/>
+          </a:prstGeom>
+          <a:noFill/>
+        </p:spPr>
+        <p:txBody>
+          <a:bodyPr wrap="square" rtlCol="0">
+            <a:spAutoFit/>
+          </a:bodyPr>
+          <a:lstStyle/>
+          <a:p>
+            <a:r>
+              <a:rPr lang="en-US" dirty="0"/>
+              <a:t>Temporal, Demo, Proxy each have been  horizontally scaled to 3 pods each from configuration itself</a:t>
+            </a:r>
+          </a:p>
+        </p:txBody>
+      </p:sp>
+    </p:spTree>
+    <p:extLst>
+      <p:ext uri="{BB962C8B-B14F-4D97-AF65-F5344CB8AC3E}">
+        <p14:creationId xmlns:p14="http://schemas.microsoft.com/office/powerpoint/2010/main" val="3285322426"/>
       </p:ext>
     </p:extLst>
   </p:cSld>

</xml_diff>